<commit_message>
Update a final slide
</commit_message>
<xml_diff>
--- a/BI.pptx
+++ b/BI.pptx
@@ -25667,6 +25667,57 @@
           </a:p>
         </p:txBody>
       </p:sp>
+      <p:pic>
+        <p:nvPicPr>
+          <p:cNvPr id="8" name="Рисунок 7" descr="Изображение выглядит как снимок экрана, шаблон, круг, Графика&#10;&#10;Автоматически созданное описание">
+            <a:extLst>
+              <a:ext uri="{FF2B5EF4-FFF2-40B4-BE49-F238E27FC236}">
+                <a16:creationId xmlns:a16="http://schemas.microsoft.com/office/drawing/2014/main" id="{5615F969-FC59-23F3-3744-CB758423D72E}"/>
+              </a:ext>
+            </a:extLst>
+          </p:cNvPr>
+          <p:cNvPicPr>
+            <a:picLocks noChangeAspect="1"/>
+          </p:cNvPicPr>
+          <p:nvPr/>
+        </p:nvPicPr>
+        <p:blipFill>
+          <a:blip r:embed="rId4">
+            <a:extLst>
+              <a:ext uri="{BEBA8EAE-BF5A-486C-A8C5-ECC9F3942E4B}">
+                <a14:imgProps xmlns:a14="http://schemas.microsoft.com/office/drawing/2010/main">
+                  <a14:imgLayer r:embed="rId5">
+                    <a14:imgEffect>
+                      <a14:artisticPhotocopy/>
+                    </a14:imgEffect>
+                    <a14:imgEffect>
+                      <a14:sharpenSoften amount="100000"/>
+                    </a14:imgEffect>
+                    <a14:imgEffect>
+                      <a14:brightnessContrast bright="70000" contrast="100000"/>
+                    </a14:imgEffect>
+                  </a14:imgLayer>
+                </a14:imgProps>
+              </a:ext>
+              <a:ext uri="{28A0092B-C50C-407E-A947-70E740481C1C}">
+                <a14:useLocalDpi xmlns:a14="http://schemas.microsoft.com/office/drawing/2010/main" val="0"/>
+              </a:ext>
+            </a:extLst>
+          </a:blip>
+          <a:stretch>
+            <a:fillRect/>
+          </a:stretch>
+        </p:blipFill>
+        <p:spPr>
+          <a:xfrm>
+            <a:off x="9646296" y="942392"/>
+            <a:ext cx="1614196" cy="1614196"/>
+          </a:xfrm>
+          <a:prstGeom prst="rect">
+            <a:avLst/>
+          </a:prstGeom>
+        </p:spPr>
+      </p:pic>
     </p:spTree>
     <p:extLst>
       <p:ext uri="{BB962C8B-B14F-4D97-AF65-F5344CB8AC3E}">

</xml_diff>